<commit_message>
Updated the CDR presentation
</commit_message>
<xml_diff>
--- a/Documentation/CDR - iCatching Presentation.pptx
+++ b/Documentation/CDR - iCatching Presentation.pptx
@@ -3497,6 +3497,47 @@
           </a:p>
         </p:txBody>
       </p:sp>
+      <p:pic>
+        <p:nvPicPr>
+          <p:cNvPr id="1026" name="Picture 2" descr="C:\Users\Student\Desktop\IMG_2682.JPG"/>
+          <p:cNvPicPr>
+            <a:picLocks noChangeAspect="1" noChangeArrowheads="1"/>
+          </p:cNvPicPr>
+          <p:nvPr/>
+        </p:nvPicPr>
+        <p:blipFill>
+          <a:blip r:embed="rId2" cstate="print">
+            <a:extLst>
+              <a:ext uri="{28A0092B-C50C-407E-A947-70E740481C1C}">
+                <a14:useLocalDpi xmlns:a14="http://schemas.microsoft.com/office/drawing/2010/main" val="0"/>
+              </a:ext>
+            </a:extLst>
+          </a:blip>
+          <a:srcRect/>
+          <a:stretch>
+            <a:fillRect/>
+          </a:stretch>
+        </p:blipFill>
+        <p:spPr bwMode="auto">
+          <a:xfrm>
+            <a:off x="971600" y="1196752"/>
+            <a:ext cx="7099225" cy="5302507"/>
+          </a:xfrm>
+          <a:prstGeom prst="rect">
+            <a:avLst/>
+          </a:prstGeom>
+          <a:noFill/>
+          <a:extLst>
+            <a:ext uri="{909E8E84-426E-40DD-AFC4-6F175D3DCCD1}">
+              <a14:hiddenFill xmlns:a14="http://schemas.microsoft.com/office/drawing/2010/main">
+                <a:solidFill>
+                  <a:srgbClr val="FFFFFF"/>
+                </a:solidFill>
+              </a14:hiddenFill>
+            </a:ext>
+          </a:extLst>
+        </p:spPr>
+      </p:pic>
     </p:spTree>
     <p:extLst>
       <p:ext uri="{BB962C8B-B14F-4D97-AF65-F5344CB8AC3E}">
@@ -3528,7 +3569,7 @@
                             </p:stCondLst>
                             <p:childTnLst>
                               <p:par>
-                                <p:cTn id="5" presetID="1" presetClass="entr" presetSubtype="0" fill="hold" nodeType="clickEffect">
+                                <p:cTn id="5" presetID="1" presetClass="exit" presetSubtype="0" fill="hold" nodeType="clickEffect">
                                   <p:stCondLst>
                                     <p:cond delay="0"/>
                                   </p:stCondLst>
@@ -3536,6 +3577,33 @@
                                     <p:set>
                                       <p:cBhvr>
                                         <p:cTn id="6" dur="1" fill="hold">
+                                          <p:stCondLst>
+                                            <p:cond delay="0"/>
+                                          </p:stCondLst>
+                                        </p:cTn>
+                                        <p:tgtEl>
+                                          <p:spTgt spid="1026"/>
+                                        </p:tgtEl>
+                                        <p:attrNameLst>
+                                          <p:attrName>style.visibility</p:attrName>
+                                        </p:attrNameLst>
+                                      </p:cBhvr>
+                                      <p:to>
+                                        <p:strVal val="hidden"/>
+                                      </p:to>
+                                    </p:set>
+                                  </p:childTnLst>
+                                </p:cTn>
+                              </p:par>
+                              <p:par>
+                                <p:cTn id="7" presetID="1" presetClass="entr" presetSubtype="0" fill="hold" nodeType="withEffect">
+                                  <p:stCondLst>
+                                    <p:cond delay="0"/>
+                                  </p:stCondLst>
+                                  <p:childTnLst>
+                                    <p:set>
+                                      <p:cBhvr>
+                                        <p:cTn id="8" dur="1" fill="hold">
                                           <p:stCondLst>
                                             <p:cond delay="0"/>
                                           </p:stCondLst>
@@ -3565,50 +3633,19 @@
                     </p:cTn>
                   </p:par>
                   <p:par>
-                    <p:cTn id="7" fill="hold">
+                    <p:cTn id="9" fill="hold">
                       <p:stCondLst>
                         <p:cond delay="indefinite"/>
                       </p:stCondLst>
                       <p:childTnLst>
                         <p:par>
-                          <p:cTn id="8" fill="hold">
+                          <p:cTn id="10" fill="hold">
                             <p:stCondLst>
                               <p:cond delay="0"/>
                             </p:stCondLst>
                             <p:childTnLst>
                               <p:par>
-                                <p:cTn id="9" presetID="1" presetClass="entr" presetSubtype="0" fill="hold" nodeType="clickEffect">
-                                  <p:stCondLst>
-                                    <p:cond delay="0"/>
-                                  </p:stCondLst>
-                                  <p:childTnLst>
-                                    <p:set>
-                                      <p:cBhvr>
-                                        <p:cTn id="10" dur="1" fill="hold">
-                                          <p:stCondLst>
-                                            <p:cond delay="0"/>
-                                          </p:stCondLst>
-                                        </p:cTn>
-                                        <p:tgtEl>
-                                          <p:spTgt spid="3">
-                                            <p:txEl>
-                                              <p:pRg st="1" end="1"/>
-                                            </p:txEl>
-                                          </p:spTgt>
-                                        </p:tgtEl>
-                                        <p:attrNameLst>
-                                          <p:attrName>style.visibility</p:attrName>
-                                        </p:attrNameLst>
-                                      </p:cBhvr>
-                                      <p:to>
-                                        <p:strVal val="visible"/>
-                                      </p:to>
-                                    </p:set>
-                                  </p:childTnLst>
-                                </p:cTn>
-                              </p:par>
-                              <p:par>
-                                <p:cTn id="11" presetID="1" presetClass="entr" presetSubtype="0" fill="hold" nodeType="withEffect">
+                                <p:cTn id="11" presetID="1" presetClass="entr" presetSubtype="0" fill="hold" nodeType="clickEffect">
                                   <p:stCondLst>
                                     <p:cond delay="0"/>
                                   </p:stCondLst>
@@ -3623,7 +3660,7 @@
                                         <p:tgtEl>
                                           <p:spTgt spid="3">
                                             <p:txEl>
-                                              <p:pRg st="2" end="2"/>
+                                              <p:pRg st="1" end="1"/>
                                             </p:txEl>
                                           </p:spTgt>
                                         </p:tgtEl>
@@ -3654,6 +3691,37 @@
                                         <p:tgtEl>
                                           <p:spTgt spid="3">
                                             <p:txEl>
+                                              <p:pRg st="2" end="2"/>
+                                            </p:txEl>
+                                          </p:spTgt>
+                                        </p:tgtEl>
+                                        <p:attrNameLst>
+                                          <p:attrName>style.visibility</p:attrName>
+                                        </p:attrNameLst>
+                                      </p:cBhvr>
+                                      <p:to>
+                                        <p:strVal val="visible"/>
+                                      </p:to>
+                                    </p:set>
+                                  </p:childTnLst>
+                                </p:cTn>
+                              </p:par>
+                              <p:par>
+                                <p:cTn id="15" presetID="1" presetClass="entr" presetSubtype="0" fill="hold" nodeType="withEffect">
+                                  <p:stCondLst>
+                                    <p:cond delay="0"/>
+                                  </p:stCondLst>
+                                  <p:childTnLst>
+                                    <p:set>
+                                      <p:cBhvr>
+                                        <p:cTn id="16" dur="1" fill="hold">
+                                          <p:stCondLst>
+                                            <p:cond delay="0"/>
+                                          </p:stCondLst>
+                                        </p:cTn>
+                                        <p:tgtEl>
+                                          <p:spTgt spid="3">
+                                            <p:txEl>
                                               <p:pRg st="3" end="3"/>
                                             </p:txEl>
                                           </p:spTgt>
@@ -3676,50 +3744,19 @@
                     </p:cTn>
                   </p:par>
                   <p:par>
-                    <p:cTn id="15" fill="hold">
+                    <p:cTn id="17" fill="hold">
                       <p:stCondLst>
                         <p:cond delay="indefinite"/>
                       </p:stCondLst>
                       <p:childTnLst>
                         <p:par>
-                          <p:cTn id="16" fill="hold">
+                          <p:cTn id="18" fill="hold">
                             <p:stCondLst>
                               <p:cond delay="0"/>
                             </p:stCondLst>
                             <p:childTnLst>
                               <p:par>
-                                <p:cTn id="17" presetID="1" presetClass="entr" presetSubtype="0" fill="hold" nodeType="clickEffect">
-                                  <p:stCondLst>
-                                    <p:cond delay="0"/>
-                                  </p:stCondLst>
-                                  <p:childTnLst>
-                                    <p:set>
-                                      <p:cBhvr>
-                                        <p:cTn id="18" dur="1" fill="hold">
-                                          <p:stCondLst>
-                                            <p:cond delay="0"/>
-                                          </p:stCondLst>
-                                        </p:cTn>
-                                        <p:tgtEl>
-                                          <p:spTgt spid="3">
-                                            <p:txEl>
-                                              <p:pRg st="4" end="4"/>
-                                            </p:txEl>
-                                          </p:spTgt>
-                                        </p:tgtEl>
-                                        <p:attrNameLst>
-                                          <p:attrName>style.visibility</p:attrName>
-                                        </p:attrNameLst>
-                                      </p:cBhvr>
-                                      <p:to>
-                                        <p:strVal val="visible"/>
-                                      </p:to>
-                                    </p:set>
-                                  </p:childTnLst>
-                                </p:cTn>
-                              </p:par>
-                              <p:par>
-                                <p:cTn id="19" presetID="1" presetClass="entr" presetSubtype="0" fill="hold" nodeType="withEffect">
+                                <p:cTn id="19" presetID="1" presetClass="entr" presetSubtype="0" fill="hold" nodeType="clickEffect">
                                   <p:stCondLst>
                                     <p:cond delay="0"/>
                                   </p:stCondLst>
@@ -3734,7 +3771,7 @@
                                         <p:tgtEl>
                                           <p:spTgt spid="3">
                                             <p:txEl>
-                                              <p:pRg st="5" end="5"/>
+                                              <p:pRg st="4" end="4"/>
                                             </p:txEl>
                                           </p:spTgt>
                                         </p:tgtEl>
@@ -3765,6 +3802,37 @@
                                         <p:tgtEl>
                                           <p:spTgt spid="3">
                                             <p:txEl>
+                                              <p:pRg st="5" end="5"/>
+                                            </p:txEl>
+                                          </p:spTgt>
+                                        </p:tgtEl>
+                                        <p:attrNameLst>
+                                          <p:attrName>style.visibility</p:attrName>
+                                        </p:attrNameLst>
+                                      </p:cBhvr>
+                                      <p:to>
+                                        <p:strVal val="visible"/>
+                                      </p:to>
+                                    </p:set>
+                                  </p:childTnLst>
+                                </p:cTn>
+                              </p:par>
+                              <p:par>
+                                <p:cTn id="23" presetID="1" presetClass="entr" presetSubtype="0" fill="hold" nodeType="withEffect">
+                                  <p:stCondLst>
+                                    <p:cond delay="0"/>
+                                  </p:stCondLst>
+                                  <p:childTnLst>
+                                    <p:set>
+                                      <p:cBhvr>
+                                        <p:cTn id="24" dur="1" fill="hold">
+                                          <p:stCondLst>
+                                            <p:cond delay="0"/>
+                                          </p:stCondLst>
+                                        </p:cTn>
+                                        <p:tgtEl>
+                                          <p:spTgt spid="3">
+                                            <p:txEl>
                                               <p:pRg st="6" end="6"/>
                                             </p:txEl>
                                           </p:spTgt>
@@ -3787,50 +3855,19 @@
                     </p:cTn>
                   </p:par>
                   <p:par>
-                    <p:cTn id="23" fill="hold">
+                    <p:cTn id="25" fill="hold">
                       <p:stCondLst>
                         <p:cond delay="indefinite"/>
                       </p:stCondLst>
                       <p:childTnLst>
                         <p:par>
-                          <p:cTn id="24" fill="hold">
+                          <p:cTn id="26" fill="hold">
                             <p:stCondLst>
                               <p:cond delay="0"/>
                             </p:stCondLst>
                             <p:childTnLst>
                               <p:par>
-                                <p:cTn id="25" presetID="1" presetClass="entr" presetSubtype="0" fill="hold" nodeType="clickEffect">
-                                  <p:stCondLst>
-                                    <p:cond delay="0"/>
-                                  </p:stCondLst>
-                                  <p:childTnLst>
-                                    <p:set>
-                                      <p:cBhvr>
-                                        <p:cTn id="26" dur="1" fill="hold">
-                                          <p:stCondLst>
-                                            <p:cond delay="0"/>
-                                          </p:stCondLst>
-                                        </p:cTn>
-                                        <p:tgtEl>
-                                          <p:spTgt spid="3">
-                                            <p:txEl>
-                                              <p:pRg st="7" end="7"/>
-                                            </p:txEl>
-                                          </p:spTgt>
-                                        </p:tgtEl>
-                                        <p:attrNameLst>
-                                          <p:attrName>style.visibility</p:attrName>
-                                        </p:attrNameLst>
-                                      </p:cBhvr>
-                                      <p:to>
-                                        <p:strVal val="visible"/>
-                                      </p:to>
-                                    </p:set>
-                                  </p:childTnLst>
-                                </p:cTn>
-                              </p:par>
-                              <p:par>
-                                <p:cTn id="27" presetID="1" presetClass="entr" presetSubtype="0" fill="hold" nodeType="withEffect">
+                                <p:cTn id="27" presetID="1" presetClass="entr" presetSubtype="0" fill="hold" nodeType="clickEffect">
                                   <p:stCondLst>
                                     <p:cond delay="0"/>
                                   </p:stCondLst>
@@ -3845,7 +3882,7 @@
                                         <p:tgtEl>
                                           <p:spTgt spid="3">
                                             <p:txEl>
-                                              <p:pRg st="8" end="8"/>
+                                              <p:pRg st="7" end="7"/>
                                             </p:txEl>
                                           </p:spTgt>
                                         </p:tgtEl>
@@ -3876,6 +3913,37 @@
                                         <p:tgtEl>
                                           <p:spTgt spid="3">
                                             <p:txEl>
+                                              <p:pRg st="8" end="8"/>
+                                            </p:txEl>
+                                          </p:spTgt>
+                                        </p:tgtEl>
+                                        <p:attrNameLst>
+                                          <p:attrName>style.visibility</p:attrName>
+                                        </p:attrNameLst>
+                                      </p:cBhvr>
+                                      <p:to>
+                                        <p:strVal val="visible"/>
+                                      </p:to>
+                                    </p:set>
+                                  </p:childTnLst>
+                                </p:cTn>
+                              </p:par>
+                              <p:par>
+                                <p:cTn id="31" presetID="1" presetClass="entr" presetSubtype="0" fill="hold" nodeType="withEffect">
+                                  <p:stCondLst>
+                                    <p:cond delay="0"/>
+                                  </p:stCondLst>
+                                  <p:childTnLst>
+                                    <p:set>
+                                      <p:cBhvr>
+                                        <p:cTn id="32" dur="1" fill="hold">
+                                          <p:stCondLst>
+                                            <p:cond delay="0"/>
+                                          </p:stCondLst>
+                                        </p:cTn>
+                                        <p:tgtEl>
+                                          <p:spTgt spid="3">
+                                            <p:txEl>
                                               <p:pRg st="9" end="9"/>
                                             </p:txEl>
                                           </p:spTgt>
@@ -3898,26 +3966,26 @@
                     </p:cTn>
                   </p:par>
                   <p:par>
-                    <p:cTn id="31" fill="hold">
+                    <p:cTn id="33" fill="hold">
                       <p:stCondLst>
                         <p:cond delay="indefinite"/>
                       </p:stCondLst>
                       <p:childTnLst>
                         <p:par>
-                          <p:cTn id="32" fill="hold">
+                          <p:cTn id="34" fill="hold">
                             <p:stCondLst>
                               <p:cond delay="0"/>
                             </p:stCondLst>
                             <p:childTnLst>
                               <p:par>
-                                <p:cTn id="33" presetID="1" presetClass="entr" presetSubtype="0" fill="hold" nodeType="clickEffect">
+                                <p:cTn id="35" presetID="1" presetClass="entr" presetSubtype="0" fill="hold" nodeType="clickEffect">
                                   <p:stCondLst>
                                     <p:cond delay="0"/>
                                   </p:stCondLst>
                                   <p:childTnLst>
                                     <p:set>
                                       <p:cBhvr>
-                                        <p:cTn id="34" dur="1" fill="hold">
+                                        <p:cTn id="36" dur="1" fill="hold">
                                           <p:stCondLst>
                                             <p:cond delay="0"/>
                                           </p:stCondLst>
@@ -4119,8 +4187,131 @@
         </p:blipFill>
         <p:spPr bwMode="auto">
           <a:xfrm>
-            <a:off x="3347864" y="4077072"/>
+            <a:off x="3410266" y="4089445"/>
             <a:ext cx="2385870" cy="2645669"/>
+          </a:xfrm>
+          <a:prstGeom prst="rect">
+            <a:avLst/>
+          </a:prstGeom>
+          <a:noFill/>
+          <a:extLst>
+            <a:ext uri="{909E8E84-426E-40DD-AFC4-6F175D3DCCD1}">
+              <a14:hiddenFill xmlns:a14="http://schemas.microsoft.com/office/drawing/2010/main">
+                <a:solidFill>
+                  <a:srgbClr val="FFFFFF"/>
+                </a:solidFill>
+              </a14:hiddenFill>
+            </a:ext>
+          </a:extLst>
+        </p:spPr>
+      </p:pic>
+      <p:pic>
+        <p:nvPicPr>
+          <p:cNvPr id="2050" name="Picture 2" descr="C:\Users\Student\Desktop\IMG_2684.JPG"/>
+          <p:cNvPicPr>
+            <a:picLocks noChangeAspect="1" noChangeArrowheads="1"/>
+          </p:cNvPicPr>
+          <p:nvPr/>
+        </p:nvPicPr>
+        <p:blipFill>
+          <a:blip r:embed="rId4" cstate="print">
+            <a:extLst>
+              <a:ext uri="{28A0092B-C50C-407E-A947-70E740481C1C}">
+                <a14:useLocalDpi xmlns:a14="http://schemas.microsoft.com/office/drawing/2010/main" val="0"/>
+              </a:ext>
+            </a:extLst>
+          </a:blip>
+          <a:srcRect/>
+          <a:stretch>
+            <a:fillRect/>
+          </a:stretch>
+        </p:blipFill>
+        <p:spPr bwMode="auto">
+          <a:xfrm>
+            <a:off x="395536" y="3645024"/>
+            <a:ext cx="4005977" cy="2992119"/>
+          </a:xfrm>
+          <a:prstGeom prst="rect">
+            <a:avLst/>
+          </a:prstGeom>
+          <a:noFill/>
+          <a:extLst>
+            <a:ext uri="{909E8E84-426E-40DD-AFC4-6F175D3DCCD1}">
+              <a14:hiddenFill xmlns:a14="http://schemas.microsoft.com/office/drawing/2010/main">
+                <a:solidFill>
+                  <a:srgbClr val="FFFFFF"/>
+                </a:solidFill>
+              </a14:hiddenFill>
+            </a:ext>
+          </a:extLst>
+        </p:spPr>
+      </p:pic>
+      <p:pic>
+        <p:nvPicPr>
+          <p:cNvPr id="2051" name="Picture 3" descr="C:\Users\Student\Desktop\IMG_2683.JPG"/>
+          <p:cNvPicPr>
+            <a:picLocks noChangeAspect="1" noChangeArrowheads="1"/>
+          </p:cNvPicPr>
+          <p:nvPr/>
+        </p:nvPicPr>
+        <p:blipFill>
+          <a:blip r:embed="rId5" cstate="print">
+            <a:extLst>
+              <a:ext uri="{28A0092B-C50C-407E-A947-70E740481C1C}">
+                <a14:useLocalDpi xmlns:a14="http://schemas.microsoft.com/office/drawing/2010/main" val="0"/>
+              </a:ext>
+            </a:extLst>
+          </a:blip>
+          <a:srcRect/>
+          <a:stretch>
+            <a:fillRect/>
+          </a:stretch>
+        </p:blipFill>
+        <p:spPr bwMode="auto">
+          <a:xfrm>
+            <a:off x="4860032" y="3645023"/>
+            <a:ext cx="4005978" cy="2992119"/>
+          </a:xfrm>
+          <a:prstGeom prst="rect">
+            <a:avLst/>
+          </a:prstGeom>
+          <a:noFill/>
+          <a:extLst>
+            <a:ext uri="{909E8E84-426E-40DD-AFC4-6F175D3DCCD1}">
+              <a14:hiddenFill xmlns:a14="http://schemas.microsoft.com/office/drawing/2010/main">
+                <a:solidFill>
+                  <a:srgbClr val="FFFFFF"/>
+                </a:solidFill>
+              </a14:hiddenFill>
+            </a:ext>
+          </a:extLst>
+        </p:spPr>
+      </p:pic>
+      <p:pic>
+        <p:nvPicPr>
+          <p:cNvPr id="2052" name="Picture 4" descr="C:\Users\Student\Desktop\IMG_2686.JPG"/>
+          <p:cNvPicPr>
+            <a:picLocks noChangeAspect="1" noChangeArrowheads="1"/>
+          </p:cNvPicPr>
+          <p:nvPr/>
+        </p:nvPicPr>
+        <p:blipFill>
+          <a:blip r:embed="rId6" cstate="print">
+            <a:extLst>
+              <a:ext uri="{28A0092B-C50C-407E-A947-70E740481C1C}">
+                <a14:useLocalDpi xmlns:a14="http://schemas.microsoft.com/office/drawing/2010/main" val="0"/>
+              </a:ext>
+            </a:extLst>
+          </a:blip>
+          <a:srcRect/>
+          <a:stretch>
+            <a:fillRect/>
+          </a:stretch>
+        </p:blipFill>
+        <p:spPr bwMode="auto">
+          <a:xfrm>
+            <a:off x="1805384" y="2457691"/>
+            <a:ext cx="5595634" cy="4179452"/>
           </a:xfrm>
           <a:prstGeom prst="rect">
             <a:avLst/>
@@ -4229,6 +4420,33 @@
                                   </p:childTnLst>
                                 </p:cTn>
                               </p:par>
+                              <p:par>
+                                <p:cTn id="9" presetID="1" presetClass="entr" presetSubtype="0" fill="hold" nodeType="withEffect">
+                                  <p:stCondLst>
+                                    <p:cond delay="0"/>
+                                  </p:stCondLst>
+                                  <p:childTnLst>
+                                    <p:set>
+                                      <p:cBhvr>
+                                        <p:cTn id="10" dur="1" fill="hold">
+                                          <p:stCondLst>
+                                            <p:cond delay="0"/>
+                                          </p:stCondLst>
+                                        </p:cTn>
+                                        <p:tgtEl>
+                                          <p:spTgt spid="2052"/>
+                                        </p:tgtEl>
+                                        <p:attrNameLst>
+                                          <p:attrName>style.visibility</p:attrName>
+                                        </p:attrNameLst>
+                                      </p:cBhvr>
+                                      <p:to>
+                                        <p:strVal val="visible"/>
+                                      </p:to>
+                                    </p:set>
+                                  </p:childTnLst>
+                                </p:cTn>
+                              </p:par>
                             </p:childTnLst>
                           </p:cTn>
                         </p:par>
@@ -4236,26 +4454,26 @@
                     </p:cTn>
                   </p:par>
                   <p:par>
-                    <p:cTn id="9" fill="hold">
+                    <p:cTn id="11" fill="hold">
                       <p:stCondLst>
                         <p:cond delay="indefinite"/>
                       </p:stCondLst>
                       <p:childTnLst>
                         <p:par>
-                          <p:cTn id="10" fill="hold">
+                          <p:cTn id="12" fill="hold">
                             <p:stCondLst>
                               <p:cond delay="0"/>
                             </p:stCondLst>
                             <p:childTnLst>
                               <p:par>
-                                <p:cTn id="11" presetID="1" presetClass="entr" presetSubtype="0" fill="hold" nodeType="clickEffect">
+                                <p:cTn id="13" presetID="1" presetClass="entr" presetSubtype="0" fill="hold" nodeType="clickEffect">
                                   <p:stCondLst>
                                     <p:cond delay="0"/>
                                   </p:stCondLst>
                                   <p:childTnLst>
                                     <p:set>
                                       <p:cBhvr>
-                                        <p:cTn id="12" dur="1" fill="hold">
+                                        <p:cTn id="14" dur="1" fill="hold">
                                           <p:stCondLst>
                                             <p:cond delay="0"/>
                                           </p:stCondLst>
@@ -4278,26 +4496,8 @@
                                   </p:childTnLst>
                                 </p:cTn>
                               </p:par>
-                            </p:childTnLst>
-                          </p:cTn>
-                        </p:par>
-                      </p:childTnLst>
-                    </p:cTn>
-                  </p:par>
-                  <p:par>
-                    <p:cTn id="13" fill="hold">
-                      <p:stCondLst>
-                        <p:cond delay="indefinite"/>
-                      </p:stCondLst>
-                      <p:childTnLst>
-                        <p:par>
-                          <p:cTn id="14" fill="hold">
-                            <p:stCondLst>
-                              <p:cond delay="0"/>
-                            </p:stCondLst>
-                            <p:childTnLst>
                               <p:par>
-                                <p:cTn id="15" presetID="1" presetClass="entr" presetSubtype="0" fill="hold" nodeType="clickEffect">
+                                <p:cTn id="15" presetID="1" presetClass="entr" presetSubtype="0" fill="hold" nodeType="withEffect">
                                   <p:stCondLst>
                                     <p:cond delay="0"/>
                                   </p:stCondLst>
@@ -4305,6 +4505,87 @@
                                     <p:set>
                                       <p:cBhvr>
                                         <p:cTn id="16" dur="1" fill="hold">
+                                          <p:stCondLst>
+                                            <p:cond delay="0"/>
+                                          </p:stCondLst>
+                                        </p:cTn>
+                                        <p:tgtEl>
+                                          <p:spTgt spid="2050"/>
+                                        </p:tgtEl>
+                                        <p:attrNameLst>
+                                          <p:attrName>style.visibility</p:attrName>
+                                        </p:attrNameLst>
+                                      </p:cBhvr>
+                                      <p:to>
+                                        <p:strVal val="visible"/>
+                                      </p:to>
+                                    </p:set>
+                                  </p:childTnLst>
+                                </p:cTn>
+                              </p:par>
+                              <p:par>
+                                <p:cTn id="17" presetID="1" presetClass="entr" presetSubtype="0" fill="hold" nodeType="withEffect">
+                                  <p:stCondLst>
+                                    <p:cond delay="0"/>
+                                  </p:stCondLst>
+                                  <p:childTnLst>
+                                    <p:set>
+                                      <p:cBhvr>
+                                        <p:cTn id="18" dur="1" fill="hold">
+                                          <p:stCondLst>
+                                            <p:cond delay="0"/>
+                                          </p:stCondLst>
+                                        </p:cTn>
+                                        <p:tgtEl>
+                                          <p:spTgt spid="2051"/>
+                                        </p:tgtEl>
+                                        <p:attrNameLst>
+                                          <p:attrName>style.visibility</p:attrName>
+                                        </p:attrNameLst>
+                                      </p:cBhvr>
+                                      <p:to>
+                                        <p:strVal val="visible"/>
+                                      </p:to>
+                                    </p:set>
+                                  </p:childTnLst>
+                                </p:cTn>
+                              </p:par>
+                              <p:par>
+                                <p:cTn id="19" presetID="1" presetClass="exit" presetSubtype="0" fill="hold" nodeType="withEffect">
+                                  <p:stCondLst>
+                                    <p:cond delay="0"/>
+                                  </p:stCondLst>
+                                  <p:childTnLst>
+                                    <p:set>
+                                      <p:cBhvr>
+                                        <p:cTn id="20" dur="1" fill="hold">
+                                          <p:stCondLst>
+                                            <p:cond delay="0"/>
+                                          </p:stCondLst>
+                                        </p:cTn>
+                                        <p:tgtEl>
+                                          <p:spTgt spid="2052"/>
+                                        </p:tgtEl>
+                                        <p:attrNameLst>
+                                          <p:attrName>style.visibility</p:attrName>
+                                        </p:attrNameLst>
+                                      </p:cBhvr>
+                                      <p:to>
+                                        <p:strVal val="hidden"/>
+                                      </p:to>
+                                    </p:set>
+                                  </p:childTnLst>
+                                </p:cTn>
+                              </p:par>
+                              <p:par>
+                                <p:cTn id="21" presetID="1" presetClass="entr" presetSubtype="0" fill="hold" nodeType="withEffect">
+                                  <p:stCondLst>
+                                    <p:cond delay="0"/>
+                                  </p:stCondLst>
+                                  <p:childTnLst>
+                                    <p:set>
+                                      <p:cBhvr>
+                                        <p:cTn id="22" dur="1" fill="hold">
                                           <p:stCondLst>
                                             <p:cond delay="0"/>
                                           </p:stCondLst>
@@ -4334,26 +4615,26 @@
                     </p:cTn>
                   </p:par>
                   <p:par>
-                    <p:cTn id="17" fill="hold">
+                    <p:cTn id="23" fill="hold">
                       <p:stCondLst>
                         <p:cond delay="indefinite"/>
                       </p:stCondLst>
                       <p:childTnLst>
                         <p:par>
-                          <p:cTn id="18" fill="hold">
+                          <p:cTn id="24" fill="hold">
                             <p:stCondLst>
                               <p:cond delay="0"/>
                             </p:stCondLst>
                             <p:childTnLst>
                               <p:par>
-                                <p:cTn id="19" presetID="1" presetClass="entr" presetSubtype="0" fill="hold" nodeType="clickEffect">
+                                <p:cTn id="25" presetID="1" presetClass="entr" presetSubtype="0" fill="hold" nodeType="clickEffect">
                                   <p:stCondLst>
                                     <p:cond delay="0"/>
                                   </p:stCondLst>
                                   <p:childTnLst>
                                     <p:set>
                                       <p:cBhvr>
-                                        <p:cTn id="20" dur="1" fill="hold">
+                                        <p:cTn id="26" dur="1" fill="hold">
                                           <p:stCondLst>
                                             <p:cond delay="0"/>
                                           </p:stCondLst>
@@ -4371,6 +4652,87 @@
                                       </p:cBhvr>
                                       <p:to>
                                         <p:strVal val="visible"/>
+                                      </p:to>
+                                    </p:set>
+                                  </p:childTnLst>
+                                </p:cTn>
+                              </p:par>
+                              <p:par>
+                                <p:cTn id="27" presetID="1" presetClass="entr" presetSubtype="0" fill="hold" nodeType="withEffect">
+                                  <p:stCondLst>
+                                    <p:cond delay="0"/>
+                                  </p:stCondLst>
+                                  <p:childTnLst>
+                                    <p:set>
+                                      <p:cBhvr>
+                                        <p:cTn id="28" dur="1" fill="hold">
+                                          <p:stCondLst>
+                                            <p:cond delay="0"/>
+                                          </p:stCondLst>
+                                        </p:cTn>
+                                        <p:tgtEl>
+                                          <p:spTgt spid="1026"/>
+                                        </p:tgtEl>
+                                        <p:attrNameLst>
+                                          <p:attrName>style.visibility</p:attrName>
+                                        </p:attrNameLst>
+                                      </p:cBhvr>
+                                      <p:to>
+                                        <p:strVal val="visible"/>
+                                      </p:to>
+                                    </p:set>
+                                  </p:childTnLst>
+                                </p:cTn>
+                              </p:par>
+                              <p:par>
+                                <p:cTn id="29" presetID="1" presetClass="exit" presetSubtype="0" fill="hold" nodeType="withEffect">
+                                  <p:stCondLst>
+                                    <p:cond delay="0"/>
+                                  </p:stCondLst>
+                                  <p:childTnLst>
+                                    <p:set>
+                                      <p:cBhvr>
+                                        <p:cTn id="30" dur="1" fill="hold">
+                                          <p:stCondLst>
+                                            <p:cond delay="0"/>
+                                          </p:stCondLst>
+                                        </p:cTn>
+                                        <p:tgtEl>
+                                          <p:spTgt spid="2050"/>
+                                        </p:tgtEl>
+                                        <p:attrNameLst>
+                                          <p:attrName>style.visibility</p:attrName>
+                                        </p:attrNameLst>
+                                      </p:cBhvr>
+                                      <p:to>
+                                        <p:strVal val="hidden"/>
+                                      </p:to>
+                                    </p:set>
+                                  </p:childTnLst>
+                                </p:cTn>
+                              </p:par>
+                              <p:par>
+                                <p:cTn id="31" presetID="1" presetClass="exit" presetSubtype="0" fill="hold" nodeType="withEffect">
+                                  <p:stCondLst>
+                                    <p:cond delay="0"/>
+                                  </p:stCondLst>
+                                  <p:childTnLst>
+                                    <p:set>
+                                      <p:cBhvr>
+                                        <p:cTn id="32" dur="1" fill="hold">
+                                          <p:stCondLst>
+                                            <p:cond delay="0"/>
+                                          </p:stCondLst>
+                                        </p:cTn>
+                                        <p:tgtEl>
+                                          <p:spTgt spid="2051"/>
+                                        </p:tgtEl>
+                                        <p:attrNameLst>
+                                          <p:attrName>style.visibility</p:attrName>
+                                        </p:attrNameLst>
+                                      </p:cBhvr>
+                                      <p:to>
+                                        <p:strVal val="hidden"/>
                                       </p:to>
                                     </p:set>
                                   </p:childTnLst>
@@ -4447,8 +4809,8 @@
           </a:p>
         </p:txBody>
       </p:sp>
-      <mc:AlternateContent xmlns:mc="http://schemas.openxmlformats.org/markup-compatibility/2006">
-        <mc:Choice xmlns:a14="http://schemas.microsoft.com/office/drawing/2010/main" Requires="a14">
+      <mc:AlternateContent xmlns:mc="http://schemas.openxmlformats.org/markup-compatibility/2006" xmlns:a14="http://schemas.microsoft.com/office/drawing/2010/main">
+        <mc:Choice Requires="a14">
           <p:sp>
             <p:nvSpPr>
               <p:cNvPr id="3" name="Content Placeholder 2"/>
@@ -4578,7 +4940,7 @@
             </p:txBody>
           </p:sp>
         </mc:Choice>
-        <mc:Fallback>
+        <mc:Fallback xmlns="">
           <p:sp>
             <p:nvSpPr>
               <p:cNvPr id="3" name="Content Placeholder 2"/>
@@ -4612,6 +4974,86 @@
           </p:sp>
         </mc:Fallback>
       </mc:AlternateContent>
+      <p:pic>
+        <p:nvPicPr>
+          <p:cNvPr id="3074" name="Picture 2" descr="C:\Users\Student\Desktop\IMG_2685.JPG"/>
+          <p:cNvPicPr>
+            <a:picLocks noChangeAspect="1" noChangeArrowheads="1"/>
+          </p:cNvPicPr>
+          <p:nvPr/>
+        </p:nvPicPr>
+        <p:blipFill>
+          <a:blip r:embed="rId3" cstate="print">
+            <a:extLst>
+              <a:ext uri="{28A0092B-C50C-407E-A947-70E740481C1C}">
+                <a14:useLocalDpi xmlns:a14="http://schemas.microsoft.com/office/drawing/2010/main" val="0"/>
+              </a:ext>
+            </a:extLst>
+          </a:blip>
+          <a:srcRect/>
+          <a:stretch>
+            <a:fillRect/>
+          </a:stretch>
+        </p:blipFill>
+        <p:spPr bwMode="auto">
+          <a:xfrm>
+            <a:off x="1691680" y="1772816"/>
+            <a:ext cx="5873299" cy="4386846"/>
+          </a:xfrm>
+          <a:prstGeom prst="rect">
+            <a:avLst/>
+          </a:prstGeom>
+          <a:noFill/>
+          <a:extLst>
+            <a:ext uri="{909E8E84-426E-40DD-AFC4-6F175D3DCCD1}">
+              <a14:hiddenFill xmlns:a14="http://schemas.microsoft.com/office/drawing/2010/main">
+                <a:solidFill>
+                  <a:srgbClr val="FFFFFF"/>
+                </a:solidFill>
+              </a14:hiddenFill>
+            </a:ext>
+          </a:extLst>
+        </p:spPr>
+      </p:pic>
+      <p:pic>
+        <p:nvPicPr>
+          <p:cNvPr id="3075" name="Picture 3" descr="C:\Users\Student\Desktop\24201291_10210583597458034_1464178452_o.png"/>
+          <p:cNvPicPr>
+            <a:picLocks noChangeAspect="1" noChangeArrowheads="1"/>
+          </p:cNvPicPr>
+          <p:nvPr/>
+        </p:nvPicPr>
+        <p:blipFill rotWithShape="1">
+          <a:blip r:embed="rId4">
+            <a:extLst>
+              <a:ext uri="{28A0092B-C50C-407E-A947-70E740481C1C}">
+                <a14:useLocalDpi xmlns:a14="http://schemas.microsoft.com/office/drawing/2010/main" val="0"/>
+              </a:ext>
+            </a:extLst>
+          </a:blip>
+          <a:srcRect l="3742" t="18651" b="13837"/>
+          <a:stretch/>
+        </p:blipFill>
+        <p:spPr bwMode="auto">
+          <a:xfrm>
+            <a:off x="504852" y="3199722"/>
+            <a:ext cx="8246954" cy="3253614"/>
+          </a:xfrm>
+          <a:prstGeom prst="rect">
+            <a:avLst/>
+          </a:prstGeom>
+          <a:noFill/>
+          <a:extLst>
+            <a:ext uri="{909E8E84-426E-40DD-AFC4-6F175D3DCCD1}">
+              <a14:hiddenFill xmlns:a14="http://schemas.microsoft.com/office/drawing/2010/main">
+                <a:solidFill>
+                  <a:srgbClr val="FFFFFF"/>
+                </a:solidFill>
+              </a14:hiddenFill>
+            </a:ext>
+          </a:extLst>
+        </p:spPr>
+      </p:pic>
     </p:spTree>
     <p:extLst>
       <p:ext uri="{BB962C8B-B14F-4D97-AF65-F5344CB8AC3E}">
@@ -4673,6 +5115,33 @@
                                   </p:childTnLst>
                                 </p:cTn>
                               </p:par>
+                              <p:par>
+                                <p:cTn id="7" presetID="1" presetClass="exit" presetSubtype="0" fill="hold" nodeType="withEffect">
+                                  <p:stCondLst>
+                                    <p:cond delay="0"/>
+                                  </p:stCondLst>
+                                  <p:childTnLst>
+                                    <p:set>
+                                      <p:cBhvr>
+                                        <p:cTn id="8" dur="1" fill="hold">
+                                          <p:stCondLst>
+                                            <p:cond delay="0"/>
+                                          </p:stCondLst>
+                                        </p:cTn>
+                                        <p:tgtEl>
+                                          <p:spTgt spid="3074"/>
+                                        </p:tgtEl>
+                                        <p:attrNameLst>
+                                          <p:attrName>style.visibility</p:attrName>
+                                        </p:attrNameLst>
+                                      </p:cBhvr>
+                                      <p:to>
+                                        <p:strVal val="hidden"/>
+                                      </p:to>
+                                    </p:set>
+                                  </p:childTnLst>
+                                </p:cTn>
+                              </p:par>
                             </p:childTnLst>
                           </p:cTn>
                         </p:par>
@@ -4680,50 +5149,19 @@
                     </p:cTn>
                   </p:par>
                   <p:par>
-                    <p:cTn id="7" fill="hold">
+                    <p:cTn id="9" fill="hold">
                       <p:stCondLst>
                         <p:cond delay="indefinite"/>
                       </p:stCondLst>
                       <p:childTnLst>
                         <p:par>
-                          <p:cTn id="8" fill="hold">
+                          <p:cTn id="10" fill="hold">
                             <p:stCondLst>
                               <p:cond delay="0"/>
                             </p:stCondLst>
                             <p:childTnLst>
                               <p:par>
-                                <p:cTn id="9" presetID="1" presetClass="entr" presetSubtype="0" fill="hold" nodeType="clickEffect">
-                                  <p:stCondLst>
-                                    <p:cond delay="0"/>
-                                  </p:stCondLst>
-                                  <p:childTnLst>
-                                    <p:set>
-                                      <p:cBhvr>
-                                        <p:cTn id="10" dur="1" fill="hold">
-                                          <p:stCondLst>
-                                            <p:cond delay="0"/>
-                                          </p:stCondLst>
-                                        </p:cTn>
-                                        <p:tgtEl>
-                                          <p:spTgt spid="3">
-                                            <p:txEl>
-                                              <p:pRg st="1" end="1"/>
-                                            </p:txEl>
-                                          </p:spTgt>
-                                        </p:tgtEl>
-                                        <p:attrNameLst>
-                                          <p:attrName>style.visibility</p:attrName>
-                                        </p:attrNameLst>
-                                      </p:cBhvr>
-                                      <p:to>
-                                        <p:strVal val="visible"/>
-                                      </p:to>
-                                    </p:set>
-                                  </p:childTnLst>
-                                </p:cTn>
-                              </p:par>
-                              <p:par>
-                                <p:cTn id="11" presetID="1" presetClass="entr" presetSubtype="0" fill="hold" nodeType="withEffect">
+                                <p:cTn id="11" presetID="1" presetClass="entr" presetSubtype="0" fill="hold" nodeType="clickEffect">
                                   <p:stCondLst>
                                     <p:cond delay="0"/>
                                   </p:stCondLst>
@@ -4738,7 +5176,7 @@
                                         <p:tgtEl>
                                           <p:spTgt spid="3">
                                             <p:txEl>
-                                              <p:pRg st="2" end="2"/>
+                                              <p:pRg st="1" end="1"/>
                                             </p:txEl>
                                           </p:spTgt>
                                         </p:tgtEl>
@@ -4769,7 +5207,7 @@
                                         <p:tgtEl>
                                           <p:spTgt spid="3">
                                             <p:txEl>
-                                              <p:pRg st="3" end="3"/>
+                                              <p:pRg st="2" end="2"/>
                                             </p:txEl>
                                           </p:spTgt>
                                         </p:tgtEl>
@@ -4800,9 +5238,67 @@
                                         <p:tgtEl>
                                           <p:spTgt spid="3">
                                             <p:txEl>
+                                              <p:pRg st="3" end="3"/>
+                                            </p:txEl>
+                                          </p:spTgt>
+                                        </p:tgtEl>
+                                        <p:attrNameLst>
+                                          <p:attrName>style.visibility</p:attrName>
+                                        </p:attrNameLst>
+                                      </p:cBhvr>
+                                      <p:to>
+                                        <p:strVal val="visible"/>
+                                      </p:to>
+                                    </p:set>
+                                  </p:childTnLst>
+                                </p:cTn>
+                              </p:par>
+                              <p:par>
+                                <p:cTn id="17" presetID="1" presetClass="entr" presetSubtype="0" fill="hold" nodeType="withEffect">
+                                  <p:stCondLst>
+                                    <p:cond delay="0"/>
+                                  </p:stCondLst>
+                                  <p:childTnLst>
+                                    <p:set>
+                                      <p:cBhvr>
+                                        <p:cTn id="18" dur="1" fill="hold">
+                                          <p:stCondLst>
+                                            <p:cond delay="0"/>
+                                          </p:stCondLst>
+                                        </p:cTn>
+                                        <p:tgtEl>
+                                          <p:spTgt spid="3">
+                                            <p:txEl>
                                               <p:pRg st="4" end="4"/>
                                             </p:txEl>
                                           </p:spTgt>
+                                        </p:tgtEl>
+                                        <p:attrNameLst>
+                                          <p:attrName>style.visibility</p:attrName>
+                                        </p:attrNameLst>
+                                      </p:cBhvr>
+                                      <p:to>
+                                        <p:strVal val="visible"/>
+                                      </p:to>
+                                    </p:set>
+                                  </p:childTnLst>
+                                </p:cTn>
+                              </p:par>
+                              <p:par>
+                                <p:cTn id="19" presetID="1" presetClass="entr" presetSubtype="0" fill="hold" nodeType="withEffect">
+                                  <p:stCondLst>
+                                    <p:cond delay="0"/>
+                                  </p:stCondLst>
+                                  <p:childTnLst>
+                                    <p:set>
+                                      <p:cBhvr>
+                                        <p:cTn id="20" dur="1" fill="hold">
+                                          <p:stCondLst>
+                                            <p:cond delay="0"/>
+                                          </p:stCondLst>
+                                        </p:cTn>
+                                        <p:tgtEl>
+                                          <p:spTgt spid="3075"/>
                                         </p:tgtEl>
                                         <p:attrNameLst>
                                           <p:attrName>style.visibility</p:attrName>
@@ -4822,81 +5318,19 @@
                     </p:cTn>
                   </p:par>
                   <p:par>
-                    <p:cTn id="17" fill="hold">
+                    <p:cTn id="21" fill="hold">
                       <p:stCondLst>
                         <p:cond delay="indefinite"/>
                       </p:stCondLst>
                       <p:childTnLst>
                         <p:par>
-                          <p:cTn id="18" fill="hold">
+                          <p:cTn id="22" fill="hold">
                             <p:stCondLst>
                               <p:cond delay="0"/>
                             </p:stCondLst>
                             <p:childTnLst>
                               <p:par>
-                                <p:cTn id="19" presetID="1" presetClass="entr" presetSubtype="0" fill="hold" nodeType="clickEffect">
-                                  <p:stCondLst>
-                                    <p:cond delay="0"/>
-                                  </p:stCondLst>
-                                  <p:childTnLst>
-                                    <p:set>
-                                      <p:cBhvr>
-                                        <p:cTn id="20" dur="1" fill="hold">
-                                          <p:stCondLst>
-                                            <p:cond delay="0"/>
-                                          </p:stCondLst>
-                                        </p:cTn>
-                                        <p:tgtEl>
-                                          <p:spTgt spid="3">
-                                            <p:txEl>
-                                              <p:pRg st="5" end="5"/>
-                                            </p:txEl>
-                                          </p:spTgt>
-                                        </p:tgtEl>
-                                        <p:attrNameLst>
-                                          <p:attrName>style.visibility</p:attrName>
-                                        </p:attrNameLst>
-                                      </p:cBhvr>
-                                      <p:to>
-                                        <p:strVal val="visible"/>
-                                      </p:to>
-                                    </p:set>
-                                  </p:childTnLst>
-                                </p:cTn>
-                              </p:par>
-                              <p:par>
-                                <p:cTn id="21" presetID="1" presetClass="entr" presetSubtype="0" fill="hold" nodeType="withEffect">
-                                  <p:stCondLst>
-                                    <p:cond delay="0"/>
-                                  </p:stCondLst>
-                                  <p:childTnLst>
-                                    <p:set>
-                                      <p:cBhvr>
-                                        <p:cTn id="22" dur="1" fill="hold">
-                                          <p:stCondLst>
-                                            <p:cond delay="0"/>
-                                          </p:stCondLst>
-                                        </p:cTn>
-                                        <p:tgtEl>
-                                          <p:spTgt spid="3">
-                                            <p:txEl>
-                                              <p:pRg st="6" end="6"/>
-                                            </p:txEl>
-                                          </p:spTgt>
-                                        </p:tgtEl>
-                                        <p:attrNameLst>
-                                          <p:attrName>style.visibility</p:attrName>
-                                        </p:attrNameLst>
-                                      </p:cBhvr>
-                                      <p:to>
-                                        <p:strVal val="visible"/>
-                                      </p:to>
-                                    </p:set>
-                                  </p:childTnLst>
-                                </p:cTn>
-                              </p:par>
-                              <p:par>
-                                <p:cTn id="23" presetID="1" presetClass="entr" presetSubtype="0" fill="hold" nodeType="withEffect">
+                                <p:cTn id="23" presetID="1" presetClass="entr" presetSubtype="0" fill="hold" nodeType="clickEffect">
                                   <p:stCondLst>
                                     <p:cond delay="0"/>
                                   </p:stCondLst>
@@ -4911,7 +5345,7 @@
                                         <p:tgtEl>
                                           <p:spTgt spid="3">
                                             <p:txEl>
-                                              <p:pRg st="7" end="7"/>
+                                              <p:pRg st="5" end="5"/>
                                             </p:txEl>
                                           </p:spTgt>
                                         </p:tgtEl>
@@ -4942,6 +5376,68 @@
                                         <p:tgtEl>
                                           <p:spTgt spid="3">
                                             <p:txEl>
+                                              <p:pRg st="6" end="6"/>
+                                            </p:txEl>
+                                          </p:spTgt>
+                                        </p:tgtEl>
+                                        <p:attrNameLst>
+                                          <p:attrName>style.visibility</p:attrName>
+                                        </p:attrNameLst>
+                                      </p:cBhvr>
+                                      <p:to>
+                                        <p:strVal val="visible"/>
+                                      </p:to>
+                                    </p:set>
+                                  </p:childTnLst>
+                                </p:cTn>
+                              </p:par>
+                              <p:par>
+                                <p:cTn id="27" presetID="1" presetClass="entr" presetSubtype="0" fill="hold" nodeType="withEffect">
+                                  <p:stCondLst>
+                                    <p:cond delay="0"/>
+                                  </p:stCondLst>
+                                  <p:childTnLst>
+                                    <p:set>
+                                      <p:cBhvr>
+                                        <p:cTn id="28" dur="1" fill="hold">
+                                          <p:stCondLst>
+                                            <p:cond delay="0"/>
+                                          </p:stCondLst>
+                                        </p:cTn>
+                                        <p:tgtEl>
+                                          <p:spTgt spid="3">
+                                            <p:txEl>
+                                              <p:pRg st="7" end="7"/>
+                                            </p:txEl>
+                                          </p:spTgt>
+                                        </p:tgtEl>
+                                        <p:attrNameLst>
+                                          <p:attrName>style.visibility</p:attrName>
+                                        </p:attrNameLst>
+                                      </p:cBhvr>
+                                      <p:to>
+                                        <p:strVal val="visible"/>
+                                      </p:to>
+                                    </p:set>
+                                  </p:childTnLst>
+                                </p:cTn>
+                              </p:par>
+                              <p:par>
+                                <p:cTn id="29" presetID="1" presetClass="entr" presetSubtype="0" fill="hold" nodeType="withEffect">
+                                  <p:stCondLst>
+                                    <p:cond delay="0"/>
+                                  </p:stCondLst>
+                                  <p:childTnLst>
+                                    <p:set>
+                                      <p:cBhvr>
+                                        <p:cTn id="30" dur="1" fill="hold">
+                                          <p:stCondLst>
+                                            <p:cond delay="0"/>
+                                          </p:stCondLst>
+                                        </p:cTn>
+                                        <p:tgtEl>
+                                          <p:spTgt spid="3">
+                                            <p:txEl>
                                               <p:pRg st="8" end="8"/>
                                             </p:txEl>
                                           </p:spTgt>
@@ -4957,6 +5453,33 @@
                                   </p:childTnLst>
                                 </p:cTn>
                               </p:par>
+                              <p:par>
+                                <p:cTn id="31" presetID="1" presetClass="exit" presetSubtype="0" fill="hold" nodeType="withEffect">
+                                  <p:stCondLst>
+                                    <p:cond delay="0"/>
+                                  </p:stCondLst>
+                                  <p:childTnLst>
+                                    <p:set>
+                                      <p:cBhvr>
+                                        <p:cTn id="32" dur="1" fill="hold">
+                                          <p:stCondLst>
+                                            <p:cond delay="0"/>
+                                          </p:stCondLst>
+                                        </p:cTn>
+                                        <p:tgtEl>
+                                          <p:spTgt spid="3075"/>
+                                        </p:tgtEl>
+                                        <p:attrNameLst>
+                                          <p:attrName>style.visibility</p:attrName>
+                                        </p:attrNameLst>
+                                      </p:cBhvr>
+                                      <p:to>
+                                        <p:strVal val="hidden"/>
+                                      </p:to>
+                                    </p:set>
+                                  </p:childTnLst>
+                                </p:cTn>
+                              </p:par>
                             </p:childTnLst>
                           </p:cTn>
                         </p:par>
@@ -4964,26 +5487,26 @@
                     </p:cTn>
                   </p:par>
                   <p:par>
-                    <p:cTn id="27" fill="hold">
+                    <p:cTn id="33" fill="hold">
                       <p:stCondLst>
                         <p:cond delay="indefinite"/>
                       </p:stCondLst>
                       <p:childTnLst>
                         <p:par>
-                          <p:cTn id="28" fill="hold">
+                          <p:cTn id="34" fill="hold">
                             <p:stCondLst>
                               <p:cond delay="0"/>
                             </p:stCondLst>
                             <p:childTnLst>
                               <p:par>
-                                <p:cTn id="29" presetID="1" presetClass="entr" presetSubtype="0" fill="hold" nodeType="clickEffect">
+                                <p:cTn id="35" presetID="1" presetClass="entr" presetSubtype="0" fill="hold" nodeType="clickEffect">
                                   <p:stCondLst>
                                     <p:cond delay="0"/>
                                   </p:stCondLst>
                                   <p:childTnLst>
                                     <p:set>
                                       <p:cBhvr>
-                                        <p:cTn id="30" dur="1" fill="hold">
+                                        <p:cTn id="36" dur="1" fill="hold">
                                           <p:stCondLst>
                                             <p:cond delay="0"/>
                                           </p:stCondLst>
@@ -5007,14 +5530,14 @@
                                 </p:cTn>
                               </p:par>
                               <p:par>
-                                <p:cTn id="31" presetID="1" presetClass="entr" presetSubtype="0" fill="hold" nodeType="withEffect">
+                                <p:cTn id="37" presetID="1" presetClass="entr" presetSubtype="0" fill="hold" nodeType="withEffect">
                                   <p:stCondLst>
                                     <p:cond delay="0"/>
                                   </p:stCondLst>
                                   <p:childTnLst>
                                     <p:set>
                                       <p:cBhvr>
-                                        <p:cTn id="32" dur="1" fill="hold">
+                                        <p:cTn id="38" dur="1" fill="hold">
                                           <p:stCondLst>
                                             <p:cond delay="0"/>
                                           </p:stCondLst>
@@ -5038,14 +5561,14 @@
                                 </p:cTn>
                               </p:par>
                               <p:par>
-                                <p:cTn id="33" presetID="1" presetClass="entr" presetSubtype="0" fill="hold" nodeType="withEffect">
+                                <p:cTn id="39" presetID="1" presetClass="entr" presetSubtype="0" fill="hold" nodeType="withEffect">
                                   <p:stCondLst>
                                     <p:cond delay="0"/>
                                   </p:stCondLst>
                                   <p:childTnLst>
                                     <p:set>
                                       <p:cBhvr>
-                                        <p:cTn id="34" dur="1" fill="hold">
+                                        <p:cTn id="40" dur="1" fill="hold">
                                           <p:stCondLst>
                                             <p:cond delay="0"/>
                                           </p:stCondLst>
@@ -5075,26 +5598,26 @@
                     </p:cTn>
                   </p:par>
                   <p:par>
-                    <p:cTn id="35" fill="hold">
+                    <p:cTn id="41" fill="hold">
                       <p:stCondLst>
                         <p:cond delay="indefinite"/>
                       </p:stCondLst>
                       <p:childTnLst>
                         <p:par>
-                          <p:cTn id="36" fill="hold">
+                          <p:cTn id="42" fill="hold">
                             <p:stCondLst>
                               <p:cond delay="0"/>
                             </p:stCondLst>
                             <p:childTnLst>
                               <p:par>
-                                <p:cTn id="37" presetID="1" presetClass="entr" presetSubtype="0" fill="hold" nodeType="clickEffect">
+                                <p:cTn id="43" presetID="1" presetClass="entr" presetSubtype="0" fill="hold" nodeType="clickEffect">
                                   <p:stCondLst>
                                     <p:cond delay="0"/>
                                   </p:stCondLst>
                                   <p:childTnLst>
                                     <p:set>
                                       <p:cBhvr>
-                                        <p:cTn id="38" dur="1" fill="hold">
+                                        <p:cTn id="44" dur="1" fill="hold">
                                           <p:stCondLst>
                                             <p:cond delay="0"/>
                                           </p:stCondLst>
@@ -5118,14 +5641,14 @@
                                 </p:cTn>
                               </p:par>
                               <p:par>
-                                <p:cTn id="39" presetID="1" presetClass="entr" presetSubtype="0" fill="hold" nodeType="withEffect">
+                                <p:cTn id="45" presetID="1" presetClass="entr" presetSubtype="0" fill="hold" nodeType="withEffect">
                                   <p:stCondLst>
                                     <p:cond delay="0"/>
                                   </p:stCondLst>
                                   <p:childTnLst>
                                     <p:set>
                                       <p:cBhvr>
-                                        <p:cTn id="40" dur="1" fill="hold">
+                                        <p:cTn id="46" dur="1" fill="hold">
                                           <p:stCondLst>
                                             <p:cond delay="0"/>
                                           </p:stCondLst>

</xml_diff>